<commit_message>
UI-SJN-02-010L - 플로팅 버튼 추가
</commit_message>
<xml_diff>
--- a/ppt/05-17.pptx
+++ b/ppt/05-17.pptx
@@ -6,6 +6,7 @@
   </p:sldMasterIdLst>
   <p:sldIdLst>
     <p:sldId id="276" r:id="rId2"/>
+    <p:sldId id="277" r:id="rId3"/>
   </p:sldIdLst>
   <p:sldSz cx="12192000" cy="6858000"/>
   <p:notesSz cx="6858000" cy="9144000"/>
@@ -3263,6 +3264,182 @@
 </p:sld>
 </file>
 
+<file path=ppt/slides/slide2.xml><?xml version="1.0" encoding="utf-8"?>
+<p:sld xmlns:a="http://schemas.openxmlformats.org/drawingml/2006/main" xmlns:r="http://schemas.openxmlformats.org/officeDocument/2006/relationships" xmlns:p="http://schemas.openxmlformats.org/presentationml/2006/main">
+  <p:cSld>
+    <p:spTree>
+      <p:nvGrpSpPr>
+        <p:cNvPr id="1" name=""/>
+        <p:cNvGrpSpPr/>
+        <p:nvPr/>
+      </p:nvGrpSpPr>
+      <p:grpSpPr>
+        <a:xfrm>
+          <a:off x="0" y="0"/>
+          <a:ext cx="0" cy="0"/>
+          <a:chOff x="0" y="0"/>
+          <a:chExt cx="0" cy="0"/>
+        </a:xfrm>
+      </p:grpSpPr>
+      <p:sp>
+        <p:nvSpPr>
+          <p:cNvPr id="2" name="TextBox 1"/>
+          <p:cNvSpPr txBox="1"/>
+          <p:nvPr/>
+        </p:nvSpPr>
+        <p:spPr>
+          <a:xfrm>
+            <a:off x="299803" y="217357"/>
+            <a:ext cx="1872629" cy="369332"/>
+          </a:xfrm>
+          <a:prstGeom prst="rect">
+            <a:avLst/>
+          </a:prstGeom>
+          <a:noFill/>
+        </p:spPr>
+        <p:txBody>
+          <a:bodyPr wrap="none" rtlCol="0">
+            <a:spAutoFit/>
+          </a:bodyPr>
+          <a:lstStyle/>
+          <a:p>
+            <a:r>
+              <a:rPr lang="en-US" altLang="ko-KR" sz="1800" b="0" i="0" baseline="0" dirty="0">
+                <a:latin typeface="+mn-ea"/>
+                <a:ea typeface="+mn-ea"/>
+              </a:rPr>
+              <a:t>UI-SJN-02-010L</a:t>
+            </a:r>
+            <a:endParaRPr lang="ko-KR" altLang="en-US" dirty="0"/>
+          </a:p>
+        </p:txBody>
+      </p:sp>
+      <p:pic>
+        <p:nvPicPr>
+          <p:cNvPr id="7" name="그림 6">
+            <a:extLst>
+              <a:ext uri="{FF2B5EF4-FFF2-40B4-BE49-F238E27FC236}">
+                <a16:creationId xmlns:a16="http://schemas.microsoft.com/office/drawing/2014/main" id="{2C0E0CED-CBF4-6D1A-B915-976D1975C139}"/>
+              </a:ext>
+            </a:extLst>
+          </p:cNvPr>
+          <p:cNvPicPr>
+            <a:picLocks noChangeAspect="1"/>
+          </p:cNvPicPr>
+          <p:nvPr/>
+        </p:nvPicPr>
+        <p:blipFill>
+          <a:blip r:embed="rId2"/>
+          <a:stretch>
+            <a:fillRect/>
+          </a:stretch>
+        </p:blipFill>
+        <p:spPr>
+          <a:xfrm>
+            <a:off x="475430" y="1001498"/>
+            <a:ext cx="4163006" cy="3077004"/>
+          </a:xfrm>
+          <a:prstGeom prst="rect">
+            <a:avLst/>
+          </a:prstGeom>
+        </p:spPr>
+      </p:pic>
+      <p:cxnSp>
+        <p:nvCxnSpPr>
+          <p:cNvPr id="12" name="직선 화살표 연결선 11">
+            <a:extLst>
+              <a:ext uri="{FF2B5EF4-FFF2-40B4-BE49-F238E27FC236}">
+                <a16:creationId xmlns:a16="http://schemas.microsoft.com/office/drawing/2014/main" id="{1FEFB13F-5CE6-822F-52CF-F6E021A7F8D0}"/>
+              </a:ext>
+            </a:extLst>
+          </p:cNvPr>
+          <p:cNvCxnSpPr/>
+          <p:nvPr/>
+        </p:nvCxnSpPr>
+        <p:spPr>
+          <a:xfrm flipV="1">
+            <a:off x="2675467" y="3892235"/>
+            <a:ext cx="0" cy="846667"/>
+          </a:xfrm>
+          <a:prstGeom prst="straightConnector1">
+            <a:avLst/>
+          </a:prstGeom>
+          <a:ln>
+            <a:tailEnd type="triangle"/>
+          </a:ln>
+        </p:spPr>
+        <p:style>
+          <a:lnRef idx="1">
+            <a:schemeClr val="accent1"/>
+          </a:lnRef>
+          <a:fillRef idx="0">
+            <a:schemeClr val="accent1"/>
+          </a:fillRef>
+          <a:effectRef idx="0">
+            <a:schemeClr val="accent1"/>
+          </a:effectRef>
+          <a:fontRef idx="minor">
+            <a:schemeClr val="tx1"/>
+          </a:fontRef>
+        </p:style>
+      </p:cxnSp>
+      <p:sp>
+        <p:nvSpPr>
+          <p:cNvPr id="13" name="TextBox 12">
+            <a:extLst>
+              <a:ext uri="{FF2B5EF4-FFF2-40B4-BE49-F238E27FC236}">
+                <a16:creationId xmlns:a16="http://schemas.microsoft.com/office/drawing/2014/main" id="{E34710AD-6980-D4B3-BA19-EE35602EAA4B}"/>
+              </a:ext>
+            </a:extLst>
+          </p:cNvPr>
+          <p:cNvSpPr txBox="1"/>
+          <p:nvPr/>
+        </p:nvSpPr>
+        <p:spPr>
+          <a:xfrm>
+            <a:off x="1236117" y="4910667"/>
+            <a:ext cx="3169457" cy="369332"/>
+          </a:xfrm>
+          <a:prstGeom prst="rect">
+            <a:avLst/>
+          </a:prstGeom>
+          <a:noFill/>
+        </p:spPr>
+        <p:txBody>
+          <a:bodyPr wrap="none" rtlCol="0">
+            <a:spAutoFit/>
+          </a:bodyPr>
+          <a:lstStyle/>
+          <a:p>
+            <a:r>
+              <a:rPr lang="ko-KR" altLang="en-US" dirty="0" err="1"/>
+              <a:t>플로팅</a:t>
+            </a:r>
+            <a:r>
+              <a:rPr lang="ko-KR" altLang="en-US" dirty="0"/>
+              <a:t> 버튼을 추가했습니다</a:t>
+            </a:r>
+            <a:r>
+              <a:rPr lang="en-US" altLang="ko-KR" dirty="0"/>
+              <a:t>.</a:t>
+            </a:r>
+            <a:endParaRPr lang="ko-KR" altLang="en-US" dirty="0"/>
+          </a:p>
+        </p:txBody>
+      </p:sp>
+    </p:spTree>
+    <p:extLst>
+      <p:ext uri="{BB962C8B-B14F-4D97-AF65-F5344CB8AC3E}">
+        <p14:creationId xmlns:p14="http://schemas.microsoft.com/office/powerpoint/2010/main" val="2024743176"/>
+      </p:ext>
+    </p:extLst>
+  </p:cSld>
+  <p:clrMapOvr>
+    <a:masterClrMapping/>
+  </p:clrMapOvr>
+</p:sld>
+</file>
+
 <file path=ppt/theme/theme1.xml><?xml version="1.0" encoding="utf-8"?>
 <a:theme xmlns:a="http://schemas.openxmlformats.org/drawingml/2006/main" name="Office 테마">
   <a:themeElements>

</xml_diff>